<commit_message>
Mise à jour debut octobre v2
</commit_message>
<xml_diff>
--- a/images/logo GdC.pptx
+++ b/images/logo GdC.pptx
@@ -12,7 +12,8 @@
     <p:sldId id="262" r:id="rId6"/>
     <p:sldId id="263" r:id="rId7"/>
     <p:sldId id="264" r:id="rId8"/>
-    <p:sldId id="261" r:id="rId9"/>
+    <p:sldId id="265" r:id="rId9"/>
+    <p:sldId id="261" r:id="rId10"/>
   </p:sldIdLst>
   <p:sldSz cx="9144000" cy="6858000" type="screen4x3"/>
   <p:notesSz cx="6858000" cy="9144000"/>
@@ -259,25 +260,25 @@
             </c:numRef>
           </c:val>
         </c:ser>
-        <c:axId val="144452608"/>
-        <c:axId val="145559552"/>
+        <c:axId val="72235264"/>
+        <c:axId val="72241152"/>
       </c:barChart>
       <c:catAx>
-        <c:axId val="144452608"/>
+        <c:axId val="72235264"/>
         <c:scaling>
           <c:orientation val="minMax"/>
         </c:scaling>
         <c:axPos val="b"/>
         <c:numFmt formatCode="General" sourceLinked="1"/>
         <c:tickLblPos val="nextTo"/>
-        <c:crossAx val="145559552"/>
+        <c:crossAx val="72241152"/>
         <c:crosses val="autoZero"/>
         <c:auto val="1"/>
         <c:lblAlgn val="ctr"/>
         <c:lblOffset val="100"/>
       </c:catAx>
       <c:valAx>
-        <c:axId val="145559552"/>
+        <c:axId val="72241152"/>
         <c:scaling>
           <c:orientation val="minMax"/>
         </c:scaling>
@@ -285,7 +286,7 @@
         <c:majorGridlines/>
         <c:numFmt formatCode="General" sourceLinked="1"/>
         <c:tickLblPos val="nextTo"/>
-        <c:crossAx val="144452608"/>
+        <c:crossAx val="72235264"/>
         <c:crosses val="autoZero"/>
         <c:crossBetween val="between"/>
       </c:valAx>
@@ -487,7 +488,8 @@
           <a:p>
             <a:fld id="{C6779A14-E19D-4F5F-A99B-DD885E886F3F}" type="datetimeFigureOut">
               <a:rPr lang="fr-FR" smtClean="0"/>
-              <a:t>17/02/2018</a:t>
+              <a:pPr/>
+              <a:t>06/07/2018</a:t>
             </a:fld>
             <a:endParaRPr lang="fr-FR"/>
           </a:p>
@@ -529,6 +531,7 @@
           <a:p>
             <a:fld id="{ECF1F234-5734-4C0D-8E9F-4D0F4C0B94FD}" type="slidenum">
               <a:rPr lang="fr-FR" smtClean="0"/>
+              <a:pPr/>
               <a:t>‹N°›</a:t>
             </a:fld>
             <a:endParaRPr lang="fr-FR"/>
@@ -652,7 +655,8 @@
           <a:p>
             <a:fld id="{C6779A14-E19D-4F5F-A99B-DD885E886F3F}" type="datetimeFigureOut">
               <a:rPr lang="fr-FR" smtClean="0"/>
-              <a:t>17/02/2018</a:t>
+              <a:pPr/>
+              <a:t>06/07/2018</a:t>
             </a:fld>
             <a:endParaRPr lang="fr-FR"/>
           </a:p>
@@ -694,6 +698,7 @@
           <a:p>
             <a:fld id="{ECF1F234-5734-4C0D-8E9F-4D0F4C0B94FD}" type="slidenum">
               <a:rPr lang="fr-FR" smtClean="0"/>
+              <a:pPr/>
               <a:t>‹N°›</a:t>
             </a:fld>
             <a:endParaRPr lang="fr-FR"/>
@@ -827,7 +832,8 @@
           <a:p>
             <a:fld id="{C6779A14-E19D-4F5F-A99B-DD885E886F3F}" type="datetimeFigureOut">
               <a:rPr lang="fr-FR" smtClean="0"/>
-              <a:t>17/02/2018</a:t>
+              <a:pPr/>
+              <a:t>06/07/2018</a:t>
             </a:fld>
             <a:endParaRPr lang="fr-FR"/>
           </a:p>
@@ -869,6 +875,7 @@
           <a:p>
             <a:fld id="{ECF1F234-5734-4C0D-8E9F-4D0F4C0B94FD}" type="slidenum">
               <a:rPr lang="fr-FR" smtClean="0"/>
+              <a:pPr/>
               <a:t>‹N°›</a:t>
             </a:fld>
             <a:endParaRPr lang="fr-FR"/>
@@ -992,7 +999,8 @@
           <a:p>
             <a:fld id="{C6779A14-E19D-4F5F-A99B-DD885E886F3F}" type="datetimeFigureOut">
               <a:rPr lang="fr-FR" smtClean="0"/>
-              <a:t>17/02/2018</a:t>
+              <a:pPr/>
+              <a:t>06/07/2018</a:t>
             </a:fld>
             <a:endParaRPr lang="fr-FR"/>
           </a:p>
@@ -1034,6 +1042,7 @@
           <a:p>
             <a:fld id="{ECF1F234-5734-4C0D-8E9F-4D0F4C0B94FD}" type="slidenum">
               <a:rPr lang="fr-FR" smtClean="0"/>
+              <a:pPr/>
               <a:t>‹N°›</a:t>
             </a:fld>
             <a:endParaRPr lang="fr-FR"/>
@@ -1233,7 +1242,8 @@
           <a:p>
             <a:fld id="{C6779A14-E19D-4F5F-A99B-DD885E886F3F}" type="datetimeFigureOut">
               <a:rPr lang="fr-FR" smtClean="0"/>
-              <a:t>17/02/2018</a:t>
+              <a:pPr/>
+              <a:t>06/07/2018</a:t>
             </a:fld>
             <a:endParaRPr lang="fr-FR"/>
           </a:p>
@@ -1275,6 +1285,7 @@
           <a:p>
             <a:fld id="{ECF1F234-5734-4C0D-8E9F-4D0F4C0B94FD}" type="slidenum">
               <a:rPr lang="fr-FR" smtClean="0"/>
+              <a:pPr/>
               <a:t>‹N°›</a:t>
             </a:fld>
             <a:endParaRPr lang="fr-FR"/>
@@ -1516,7 +1527,8 @@
           <a:p>
             <a:fld id="{C6779A14-E19D-4F5F-A99B-DD885E886F3F}" type="datetimeFigureOut">
               <a:rPr lang="fr-FR" smtClean="0"/>
-              <a:t>17/02/2018</a:t>
+              <a:pPr/>
+              <a:t>06/07/2018</a:t>
             </a:fld>
             <a:endParaRPr lang="fr-FR"/>
           </a:p>
@@ -1558,6 +1570,7 @@
           <a:p>
             <a:fld id="{ECF1F234-5734-4C0D-8E9F-4D0F4C0B94FD}" type="slidenum">
               <a:rPr lang="fr-FR" smtClean="0"/>
+              <a:pPr/>
               <a:t>‹N°›</a:t>
             </a:fld>
             <a:endParaRPr lang="fr-FR"/>
@@ -1933,7 +1946,8 @@
           <a:p>
             <a:fld id="{C6779A14-E19D-4F5F-A99B-DD885E886F3F}" type="datetimeFigureOut">
               <a:rPr lang="fr-FR" smtClean="0"/>
-              <a:t>17/02/2018</a:t>
+              <a:pPr/>
+              <a:t>06/07/2018</a:t>
             </a:fld>
             <a:endParaRPr lang="fr-FR"/>
           </a:p>
@@ -1975,6 +1989,7 @@
           <a:p>
             <a:fld id="{ECF1F234-5734-4C0D-8E9F-4D0F4C0B94FD}" type="slidenum">
               <a:rPr lang="fr-FR" smtClean="0"/>
+              <a:pPr/>
               <a:t>‹N°›</a:t>
             </a:fld>
             <a:endParaRPr lang="fr-FR"/>
@@ -2046,7 +2061,8 @@
           <a:p>
             <a:fld id="{C6779A14-E19D-4F5F-A99B-DD885E886F3F}" type="datetimeFigureOut">
               <a:rPr lang="fr-FR" smtClean="0"/>
-              <a:t>17/02/2018</a:t>
+              <a:pPr/>
+              <a:t>06/07/2018</a:t>
             </a:fld>
             <a:endParaRPr lang="fr-FR"/>
           </a:p>
@@ -2088,6 +2104,7 @@
           <a:p>
             <a:fld id="{ECF1F234-5734-4C0D-8E9F-4D0F4C0B94FD}" type="slidenum">
               <a:rPr lang="fr-FR" smtClean="0"/>
+              <a:pPr/>
               <a:t>‹N°›</a:t>
             </a:fld>
             <a:endParaRPr lang="fr-FR"/>
@@ -2136,7 +2153,8 @@
           <a:p>
             <a:fld id="{C6779A14-E19D-4F5F-A99B-DD885E886F3F}" type="datetimeFigureOut">
               <a:rPr lang="fr-FR" smtClean="0"/>
-              <a:t>17/02/2018</a:t>
+              <a:pPr/>
+              <a:t>06/07/2018</a:t>
             </a:fld>
             <a:endParaRPr lang="fr-FR"/>
           </a:p>
@@ -2178,6 +2196,7 @@
           <a:p>
             <a:fld id="{ECF1F234-5734-4C0D-8E9F-4D0F4C0B94FD}" type="slidenum">
               <a:rPr lang="fr-FR" smtClean="0"/>
+              <a:pPr/>
               <a:t>‹N°›</a:t>
             </a:fld>
             <a:endParaRPr lang="fr-FR"/>
@@ -2408,7 +2427,8 @@
           <a:p>
             <a:fld id="{C6779A14-E19D-4F5F-A99B-DD885E886F3F}" type="datetimeFigureOut">
               <a:rPr lang="fr-FR" smtClean="0"/>
-              <a:t>17/02/2018</a:t>
+              <a:pPr/>
+              <a:t>06/07/2018</a:t>
             </a:fld>
             <a:endParaRPr lang="fr-FR"/>
           </a:p>
@@ -2450,6 +2470,7 @@
           <a:p>
             <a:fld id="{ECF1F234-5734-4C0D-8E9F-4D0F4C0B94FD}" type="slidenum">
               <a:rPr lang="fr-FR" smtClean="0"/>
+              <a:pPr/>
               <a:t>‹N°›</a:t>
             </a:fld>
             <a:endParaRPr lang="fr-FR"/>
@@ -2656,7 +2677,8 @@
           <a:p>
             <a:fld id="{C6779A14-E19D-4F5F-A99B-DD885E886F3F}" type="datetimeFigureOut">
               <a:rPr lang="fr-FR" smtClean="0"/>
-              <a:t>17/02/2018</a:t>
+              <a:pPr/>
+              <a:t>06/07/2018</a:t>
             </a:fld>
             <a:endParaRPr lang="fr-FR"/>
           </a:p>
@@ -2698,6 +2720,7 @@
           <a:p>
             <a:fld id="{ECF1F234-5734-4C0D-8E9F-4D0F4C0B94FD}" type="slidenum">
               <a:rPr lang="fr-FR" smtClean="0"/>
+              <a:pPr/>
               <a:t>‹N°›</a:t>
             </a:fld>
             <a:endParaRPr lang="fr-FR"/>
@@ -2864,7 +2887,8 @@
           <a:p>
             <a:fld id="{C6779A14-E19D-4F5F-A99B-DD885E886F3F}" type="datetimeFigureOut">
               <a:rPr lang="fr-FR" smtClean="0"/>
-              <a:t>17/02/2018</a:t>
+              <a:pPr/>
+              <a:t>06/07/2018</a:t>
             </a:fld>
             <a:endParaRPr lang="fr-FR"/>
           </a:p>
@@ -2942,6 +2966,7 @@
           <a:p>
             <a:fld id="{ECF1F234-5734-4C0D-8E9F-4D0F4C0B94FD}" type="slidenum">
               <a:rPr lang="fr-FR" smtClean="0"/>
+              <a:pPr/>
               <a:t>‹N°›</a:t>
             </a:fld>
             <a:endParaRPr lang="fr-FR"/>
@@ -7681,6 +7706,546 @@
       </p:grpSpPr>
       <p:pic>
         <p:nvPicPr>
+          <p:cNvPr id="21" name="Image 20" descr="logo controle.png"/>
+          <p:cNvPicPr>
+            <a:picLocks noChangeAspect="1"/>
+          </p:cNvPicPr>
+          <p:nvPr/>
+        </p:nvPicPr>
+        <p:blipFill>
+          <a:blip r:embed="rId2" cstate="print"/>
+          <a:srcRect l="7557" t="9608"/>
+          <a:stretch>
+            <a:fillRect/>
+          </a:stretch>
+        </p:blipFill>
+        <p:spPr>
+          <a:xfrm>
+            <a:off x="1907704" y="2032661"/>
+            <a:ext cx="1008112" cy="748267"/>
+          </a:xfrm>
+          <a:prstGeom prst="rect">
+            <a:avLst/>
+          </a:prstGeom>
+        </p:spPr>
+      </p:pic>
+      <p:grpSp>
+        <p:nvGrpSpPr>
+          <p:cNvPr id="10" name="Groupe 21"/>
+          <p:cNvGrpSpPr/>
+          <p:nvPr/>
+        </p:nvGrpSpPr>
+        <p:grpSpPr>
+          <a:xfrm>
+            <a:off x="395536" y="404664"/>
+            <a:ext cx="2505650" cy="3600400"/>
+            <a:chOff x="4572000" y="3789040"/>
+            <a:chExt cx="2505650" cy="3600400"/>
+          </a:xfrm>
+        </p:grpSpPr>
+        <p:sp>
+          <p:nvSpPr>
+            <p:cNvPr id="18" name="Sous-titre 2"/>
+            <p:cNvSpPr txBox="1">
+              <a:spLocks/>
+            </p:cNvSpPr>
+            <p:nvPr/>
+          </p:nvSpPr>
+          <p:spPr>
+            <a:xfrm>
+              <a:off x="5415903" y="4118090"/>
+              <a:ext cx="1661747" cy="3271350"/>
+            </a:xfrm>
+            <a:prstGeom prst="rect">
+              <a:avLst/>
+            </a:prstGeom>
+          </p:spPr>
+          <p:txBody>
+            <a:bodyPr vert="horz" lIns="91440" tIns="45720" rIns="91440" bIns="45720" rtlCol="0">
+              <a:noAutofit/>
+            </a:bodyPr>
+            <a:lstStyle/>
+            <a:p>
+              <a:pPr marL="0" marR="0" lvl="0" indent="0" algn="ctr" defTabSz="914400" rtl="0" eaLnBrk="1" fontAlgn="auto" latinLnBrk="0" hangingPunct="1">
+                <a:lnSpc>
+                  <a:spcPct val="100000"/>
+                </a:lnSpc>
+                <a:spcBef>
+                  <a:spcPct val="20000"/>
+                </a:spcBef>
+                <a:spcAft>
+                  <a:spcPts val="0"/>
+                </a:spcAft>
+                <a:buClrTx/>
+                <a:buSzTx/>
+                <a:buFont typeface="Arial" pitchFamily="34" charset="0"/>
+                <a:buNone/>
+                <a:tabLst/>
+                <a:defRPr/>
+              </a:pPr>
+              <a:r>
+                <a:rPr kumimoji="0" lang="fr-FR" sz="20000" b="0" i="0" u="none" strike="noStrike" kern="1200" cap="none" spc="0" normalizeH="0" baseline="0" noProof="0" dirty="0" smtClean="0">
+                  <a:ln>
+                    <a:solidFill>
+                      <a:srgbClr val="008080"/>
+                    </a:solidFill>
+                  </a:ln>
+                  <a:solidFill>
+                    <a:schemeClr val="accent5"/>
+                  </a:solidFill>
+                  <a:effectLst/>
+                  <a:uLnTx/>
+                  <a:uFillTx/>
+                  <a:latin typeface="AR DESTINE" pitchFamily="2" charset="0"/>
+                </a:rPr>
+                <a:t>C</a:t>
+              </a:r>
+            </a:p>
+          </p:txBody>
+        </p:sp>
+        <p:sp>
+          <p:nvSpPr>
+            <p:cNvPr id="19" name="Sous-titre 2"/>
+            <p:cNvSpPr txBox="1">
+              <a:spLocks/>
+            </p:cNvSpPr>
+            <p:nvPr/>
+          </p:nvSpPr>
+          <p:spPr>
+            <a:xfrm>
+              <a:off x="4572000" y="3789040"/>
+              <a:ext cx="1569546" cy="2592288"/>
+            </a:xfrm>
+            <a:prstGeom prst="rect">
+              <a:avLst/>
+            </a:prstGeom>
+          </p:spPr>
+          <p:txBody>
+            <a:bodyPr vert="horz" lIns="91440" tIns="45720" rIns="91440" bIns="45720" rtlCol="0">
+              <a:noAutofit/>
+            </a:bodyPr>
+            <a:lstStyle/>
+            <a:p>
+              <a:pPr marL="0" marR="0" lvl="0" indent="0" algn="ctr" defTabSz="914400" rtl="0" eaLnBrk="1" fontAlgn="auto" latinLnBrk="0" hangingPunct="1">
+                <a:lnSpc>
+                  <a:spcPct val="100000"/>
+                </a:lnSpc>
+                <a:spcBef>
+                  <a:spcPct val="20000"/>
+                </a:spcBef>
+                <a:spcAft>
+                  <a:spcPts val="0"/>
+                </a:spcAft>
+                <a:buClrTx/>
+                <a:buSzTx/>
+                <a:buFont typeface="Arial" pitchFamily="34" charset="0"/>
+                <a:buNone/>
+                <a:tabLst/>
+                <a:defRPr/>
+              </a:pPr>
+              <a:r>
+                <a:rPr kumimoji="0" lang="fr-FR" sz="19900" b="0" i="0" u="none" strike="noStrike" kern="1200" cap="none" spc="0" normalizeH="0" baseline="0" noProof="0" dirty="0" smtClean="0">
+                  <a:ln w="3175">
+                    <a:solidFill>
+                      <a:srgbClr val="008080"/>
+                    </a:solidFill>
+                  </a:ln>
+                  <a:solidFill>
+                    <a:schemeClr val="bg1"/>
+                  </a:solidFill>
+                  <a:effectLst/>
+                  <a:uLnTx/>
+                  <a:uFillTx/>
+                  <a:latin typeface="AR DESTINE" pitchFamily="2" charset="0"/>
+                </a:rPr>
+                <a:t>G</a:t>
+              </a:r>
+              <a:endParaRPr kumimoji="0" lang="fr-FR" sz="6600" b="0" i="0" u="none" strike="noStrike" kern="1200" cap="none" spc="0" normalizeH="0" baseline="0" noProof="0" dirty="0" smtClean="0">
+                <a:ln w="3175">
+                  <a:solidFill>
+                    <a:srgbClr val="008080"/>
+                  </a:solidFill>
+                </a:ln>
+                <a:solidFill>
+                  <a:schemeClr val="bg1"/>
+                </a:solidFill>
+                <a:effectLst/>
+                <a:uLnTx/>
+                <a:uFillTx/>
+                <a:latin typeface="AR DESTINE" pitchFamily="2" charset="0"/>
+              </a:endParaRPr>
+            </a:p>
+          </p:txBody>
+        </p:sp>
+        <p:sp>
+          <p:nvSpPr>
+            <p:cNvPr id="20" name="Sous-titre 2"/>
+            <p:cNvSpPr txBox="1">
+              <a:spLocks/>
+            </p:cNvSpPr>
+            <p:nvPr/>
+          </p:nvSpPr>
+          <p:spPr>
+            <a:xfrm>
+              <a:off x="4932040" y="5572584"/>
+              <a:ext cx="961326" cy="448704"/>
+            </a:xfrm>
+            <a:prstGeom prst="rect">
+              <a:avLst/>
+            </a:prstGeom>
+          </p:spPr>
+          <p:txBody>
+            <a:bodyPr vert="horz" lIns="91440" tIns="45720" rIns="91440" bIns="45720" rtlCol="0">
+              <a:noAutofit/>
+            </a:bodyPr>
+            <a:lstStyle/>
+            <a:p>
+              <a:pPr marL="0" marR="0" lvl="0" indent="0" algn="ctr" defTabSz="914400" rtl="0" eaLnBrk="1" fontAlgn="auto" latinLnBrk="0" hangingPunct="1">
+                <a:lnSpc>
+                  <a:spcPct val="100000"/>
+                </a:lnSpc>
+                <a:spcBef>
+                  <a:spcPct val="20000"/>
+                </a:spcBef>
+                <a:spcAft>
+                  <a:spcPts val="0"/>
+                </a:spcAft>
+                <a:buClrTx/>
+                <a:buSzTx/>
+                <a:buFont typeface="Arial" pitchFamily="34" charset="0"/>
+                <a:buNone/>
+                <a:tabLst/>
+                <a:defRPr/>
+              </a:pPr>
+              <a:r>
+                <a:rPr kumimoji="0" lang="fr-FR" sz="3600" b="0" i="0" u="none" strike="noStrike" kern="1200" cap="none" spc="0" normalizeH="0" baseline="0" noProof="0" dirty="0" smtClean="0">
+                  <a:ln>
+                    <a:solidFill>
+                      <a:schemeClr val="accent5">
+                        <a:lumMod val="75000"/>
+                      </a:schemeClr>
+                    </a:solidFill>
+                  </a:ln>
+                  <a:solidFill>
+                    <a:schemeClr val="accent5"/>
+                  </a:solidFill>
+                  <a:effectLst/>
+                  <a:uLnTx/>
+                  <a:uFillTx/>
+                  <a:latin typeface="AR DESTINE" pitchFamily="2" charset="0"/>
+                </a:rPr>
+                <a:t>de</a:t>
+              </a:r>
+            </a:p>
+          </p:txBody>
+        </p:sp>
+      </p:grpSp>
+      <p:pic>
+        <p:nvPicPr>
+          <p:cNvPr id="31" name="Image 30" descr="logo controle.png"/>
+          <p:cNvPicPr>
+            <a:picLocks noChangeAspect="1"/>
+          </p:cNvPicPr>
+          <p:nvPr/>
+        </p:nvPicPr>
+        <p:blipFill>
+          <a:blip r:embed="rId2" cstate="print"/>
+          <a:srcRect l="7557" t="9608"/>
+          <a:stretch>
+            <a:fillRect/>
+          </a:stretch>
+        </p:blipFill>
+        <p:spPr>
+          <a:xfrm>
+            <a:off x="7812360" y="1484784"/>
+            <a:ext cx="1008112" cy="748267"/>
+          </a:xfrm>
+          <a:prstGeom prst="rect">
+            <a:avLst/>
+          </a:prstGeom>
+        </p:spPr>
+      </p:pic>
+      <p:grpSp>
+        <p:nvGrpSpPr>
+          <p:cNvPr id="40" name="Groupe 39"/>
+          <p:cNvGrpSpPr/>
+          <p:nvPr/>
+        </p:nvGrpSpPr>
+        <p:grpSpPr>
+          <a:xfrm>
+            <a:off x="6300192" y="2708920"/>
+            <a:ext cx="2664296" cy="3628587"/>
+            <a:chOff x="6300192" y="2708920"/>
+            <a:chExt cx="2664296" cy="3628587"/>
+          </a:xfrm>
+        </p:grpSpPr>
+        <p:pic>
+          <p:nvPicPr>
+            <p:cNvPr id="1026" name="Picture 2" descr="RÃ©sultat de recherche d'images pour &quot;pile pieces de monnaie&quot;"/>
+            <p:cNvPicPr>
+              <a:picLocks noChangeAspect="1" noChangeArrowheads="1"/>
+            </p:cNvPicPr>
+            <p:nvPr/>
+          </p:nvPicPr>
+          <p:blipFill>
+            <a:blip r:embed="rId3" cstate="print"/>
+            <a:srcRect l="18182" t="9940" r="9091" b="10544"/>
+            <a:stretch>
+              <a:fillRect/>
+            </a:stretch>
+          </p:blipFill>
+          <p:spPr bwMode="auto">
+            <a:xfrm>
+              <a:off x="7956376" y="4365104"/>
+              <a:ext cx="864096" cy="864096"/>
+            </a:xfrm>
+            <a:prstGeom prst="rect">
+              <a:avLst/>
+            </a:prstGeom>
+            <a:noFill/>
+          </p:spPr>
+        </p:pic>
+        <p:grpSp>
+          <p:nvGrpSpPr>
+            <p:cNvPr id="32" name="Groupe 21"/>
+            <p:cNvGrpSpPr/>
+            <p:nvPr/>
+          </p:nvGrpSpPr>
+          <p:grpSpPr>
+            <a:xfrm>
+              <a:off x="6300192" y="2708920"/>
+              <a:ext cx="2664296" cy="3628587"/>
+              <a:chOff x="4572000" y="3760853"/>
+              <a:chExt cx="2664296" cy="3628587"/>
+            </a:xfrm>
+          </p:grpSpPr>
+          <p:sp>
+            <p:nvSpPr>
+              <p:cNvPr id="33" name="Sous-titre 2"/>
+              <p:cNvSpPr txBox="1">
+                <a:spLocks/>
+              </p:cNvSpPr>
+              <p:nvPr/>
+            </p:nvSpPr>
+            <p:spPr>
+              <a:xfrm>
+                <a:off x="5574549" y="4118090"/>
+                <a:ext cx="1661747" cy="3271350"/>
+              </a:xfrm>
+              <a:prstGeom prst="rect">
+                <a:avLst/>
+              </a:prstGeom>
+            </p:spPr>
+            <p:txBody>
+              <a:bodyPr vert="horz" lIns="91440" tIns="45720" rIns="91440" bIns="45720" rtlCol="0">
+                <a:noAutofit/>
+              </a:bodyPr>
+              <a:lstStyle/>
+              <a:p>
+                <a:pPr marL="0" marR="0" lvl="0" indent="0" algn="ctr" defTabSz="914400" rtl="0" eaLnBrk="1" fontAlgn="auto" latinLnBrk="0" hangingPunct="1">
+                  <a:lnSpc>
+                    <a:spcPct val="100000"/>
+                  </a:lnSpc>
+                  <a:spcBef>
+                    <a:spcPct val="20000"/>
+                  </a:spcBef>
+                  <a:spcAft>
+                    <a:spcPts val="0"/>
+                  </a:spcAft>
+                  <a:buClrTx/>
+                  <a:buSzTx/>
+                  <a:buFont typeface="Arial" pitchFamily="34" charset="0"/>
+                  <a:buNone/>
+                  <a:tabLst/>
+                  <a:defRPr/>
+                </a:pPr>
+                <a:r>
+                  <a:rPr kumimoji="0" lang="fr-FR" sz="20000" b="0" i="0" u="none" strike="noStrike" kern="1200" cap="none" spc="0" normalizeH="0" baseline="0" noProof="0" dirty="0" smtClean="0">
+                    <a:ln>
+                      <a:solidFill>
+                        <a:srgbClr val="008080"/>
+                      </a:solidFill>
+                    </a:ln>
+                    <a:solidFill>
+                      <a:sysClr val="windowText" lastClr="000000"/>
+                    </a:solidFill>
+                    <a:effectLst/>
+                    <a:uLnTx/>
+                    <a:uFillTx/>
+                    <a:latin typeface="AR DESTINE" pitchFamily="2" charset="0"/>
+                  </a:rPr>
+                  <a:t>C</a:t>
+                </a:r>
+              </a:p>
+            </p:txBody>
+          </p:sp>
+          <p:sp>
+            <p:nvSpPr>
+              <p:cNvPr id="34" name="Sous-titre 2"/>
+              <p:cNvSpPr txBox="1">
+                <a:spLocks/>
+              </p:cNvSpPr>
+              <p:nvPr/>
+            </p:nvSpPr>
+            <p:spPr>
+              <a:xfrm>
+                <a:off x="4572000" y="3760853"/>
+                <a:ext cx="1569546" cy="2592288"/>
+              </a:xfrm>
+              <a:prstGeom prst="rect">
+                <a:avLst/>
+              </a:prstGeom>
+            </p:spPr>
+            <p:txBody>
+              <a:bodyPr vert="horz" lIns="91440" tIns="45720" rIns="91440" bIns="45720" rtlCol="0">
+                <a:noAutofit/>
+              </a:bodyPr>
+              <a:lstStyle/>
+              <a:p>
+                <a:pPr marL="0" marR="0" lvl="0" indent="0" algn="ctr" defTabSz="914400" rtl="0" eaLnBrk="1" fontAlgn="auto" latinLnBrk="0" hangingPunct="1">
+                  <a:lnSpc>
+                    <a:spcPct val="100000"/>
+                  </a:lnSpc>
+                  <a:spcBef>
+                    <a:spcPct val="20000"/>
+                  </a:spcBef>
+                  <a:spcAft>
+                    <a:spcPts val="0"/>
+                  </a:spcAft>
+                  <a:buClrTx/>
+                  <a:buSzTx/>
+                  <a:buFont typeface="Arial" pitchFamily="34" charset="0"/>
+                  <a:buNone/>
+                  <a:tabLst/>
+                  <a:defRPr/>
+                </a:pPr>
+                <a:r>
+                  <a:rPr kumimoji="0" lang="fr-FR" sz="19900" b="0" i="0" u="none" strike="noStrike" kern="1200" cap="none" spc="0" normalizeH="0" baseline="0" noProof="0" smtClean="0">
+                    <a:ln w="19050">
+                      <a:solidFill>
+                        <a:srgbClr val="599BB9"/>
+                      </a:solidFill>
+                    </a:ln>
+                    <a:solidFill>
+                      <a:schemeClr val="bg1"/>
+                    </a:solidFill>
+                    <a:effectLst/>
+                    <a:uLnTx/>
+                    <a:uFillTx/>
+                    <a:latin typeface="AR DESTINE" pitchFamily="2" charset="0"/>
+                  </a:rPr>
+                  <a:t>G</a:t>
+                </a:r>
+                <a:endParaRPr kumimoji="0" lang="fr-FR" sz="6600" b="0" i="0" u="none" strike="noStrike" kern="1200" cap="none" spc="0" normalizeH="0" baseline="0" noProof="0" dirty="0" smtClean="0">
+                  <a:ln w="19050">
+                    <a:solidFill>
+                      <a:srgbClr val="599BB9"/>
+                    </a:solidFill>
+                  </a:ln>
+                  <a:solidFill>
+                    <a:schemeClr val="bg1"/>
+                  </a:solidFill>
+                  <a:effectLst/>
+                  <a:uLnTx/>
+                  <a:uFillTx/>
+                  <a:latin typeface="AR DESTINE" pitchFamily="2" charset="0"/>
+                </a:endParaRPr>
+              </a:p>
+            </p:txBody>
+          </p:sp>
+          <p:sp>
+            <p:nvSpPr>
+              <p:cNvPr id="38" name="Sous-titre 2"/>
+              <p:cNvSpPr txBox="1">
+                <a:spLocks/>
+              </p:cNvSpPr>
+              <p:nvPr/>
+            </p:nvSpPr>
+            <p:spPr>
+              <a:xfrm>
+                <a:off x="4932040" y="5705069"/>
+                <a:ext cx="961326" cy="360040"/>
+              </a:xfrm>
+              <a:prstGeom prst="rect">
+                <a:avLst/>
+              </a:prstGeom>
+            </p:spPr>
+            <p:txBody>
+              <a:bodyPr vert="horz" lIns="91440" tIns="45720" rIns="91440" bIns="45720" rtlCol="0">
+                <a:noAutofit/>
+              </a:bodyPr>
+              <a:lstStyle/>
+              <a:p>
+                <a:pPr marL="0" marR="0" lvl="0" indent="0" algn="ctr" defTabSz="914400" rtl="0" eaLnBrk="1" fontAlgn="auto" latinLnBrk="0" hangingPunct="1">
+                  <a:lnSpc>
+                    <a:spcPct val="100000"/>
+                  </a:lnSpc>
+                  <a:spcBef>
+                    <a:spcPct val="20000"/>
+                  </a:spcBef>
+                  <a:spcAft>
+                    <a:spcPts val="0"/>
+                  </a:spcAft>
+                  <a:buClrTx/>
+                  <a:buSzTx/>
+                  <a:buFont typeface="Arial" pitchFamily="34" charset="0"/>
+                  <a:buNone/>
+                  <a:tabLst/>
+                  <a:defRPr/>
+                </a:pPr>
+                <a:r>
+                  <a:rPr kumimoji="0" lang="fr-FR" sz="3600" b="0" i="0" u="none" strike="noStrike" kern="1200" cap="none" spc="0" normalizeH="0" baseline="0" noProof="0" dirty="0" smtClean="0">
+                    <a:solidFill>
+                      <a:schemeClr val="accent5"/>
+                    </a:solidFill>
+                    <a:effectLst/>
+                    <a:uLnTx/>
+                    <a:uFillTx/>
+                    <a:latin typeface="AR DESTINE" pitchFamily="2" charset="0"/>
+                  </a:rPr>
+                  <a:t>de</a:t>
+                </a:r>
+                <a:endParaRPr kumimoji="0" lang="fr-FR" sz="3600" b="0" i="0" u="none" strike="noStrike" kern="1200" cap="none" spc="0" normalizeH="0" baseline="0" noProof="0" dirty="0" smtClean="0">
+                  <a:solidFill>
+                    <a:schemeClr val="accent5"/>
+                  </a:solidFill>
+                  <a:effectLst/>
+                  <a:uLnTx/>
+                  <a:uFillTx/>
+                  <a:latin typeface="AR DESTINE" pitchFamily="2" charset="0"/>
+                </a:endParaRPr>
+              </a:p>
+            </p:txBody>
+          </p:sp>
+        </p:grpSp>
+      </p:grpSp>
+    </p:spTree>
+  </p:cSld>
+  <p:clrMapOvr>
+    <a:masterClrMapping/>
+  </p:clrMapOvr>
+</p:sld>
+</file>
+
+<file path=ppt/slides/slide9.xml><?xml version="1.0" encoding="utf-8"?>
+<p:sld xmlns:a="http://schemas.openxmlformats.org/drawingml/2006/main" xmlns:r="http://schemas.openxmlformats.org/officeDocument/2006/relationships" xmlns:p="http://schemas.openxmlformats.org/presentationml/2006/main">
+  <p:cSld>
+    <p:spTree>
+      <p:nvGrpSpPr>
+        <p:cNvPr id="1" name=""/>
+        <p:cNvGrpSpPr/>
+        <p:nvPr/>
+      </p:nvGrpSpPr>
+      <p:grpSpPr>
+        <a:xfrm>
+          <a:off x="0" y="0"/>
+          <a:ext cx="0" cy="0"/>
+          <a:chOff x="0" y="0"/>
+          <a:chExt cx="0" cy="0"/>
+        </a:xfrm>
+      </p:grpSpPr>
+      <p:pic>
+        <p:nvPicPr>
           <p:cNvPr id="28" name="Image 27" descr="logo_GdC_groupé.pptx.png"/>
           <p:cNvPicPr>
             <a:picLocks noChangeAspect="1"/>

</xml_diff>